<commit_message>
Update README.md to have Forced Stop Test.
</commit_message>
<xml_diff>
--- a/NWTest.pptx
+++ b/NWTest.pptx
@@ -243,7 +243,7 @@
           <a:p>
             <a:fld id="{278734C7-5BF5-4A93-8E96-ED01F4D5F738}" type="datetimeFigureOut">
               <a:rPr kumimoji="1" lang="ja-JP" altLang="en-US" smtClean="0"/>
-              <a:t>2022/7/5</a:t>
+              <a:t>2022/7/6</a:t>
             </a:fld>
             <a:endParaRPr kumimoji="1" lang="ja-JP" altLang="en-US"/>
           </a:p>
@@ -445,7 +445,7 @@
           <a:p>
             <a:fld id="{278734C7-5BF5-4A93-8E96-ED01F4D5F738}" type="datetimeFigureOut">
               <a:rPr kumimoji="1" lang="ja-JP" altLang="en-US" smtClean="0"/>
-              <a:t>2022/7/5</a:t>
+              <a:t>2022/7/6</a:t>
             </a:fld>
             <a:endParaRPr kumimoji="1" lang="ja-JP" altLang="en-US"/>
           </a:p>
@@ -657,7 +657,7 @@
           <a:p>
             <a:fld id="{278734C7-5BF5-4A93-8E96-ED01F4D5F738}" type="datetimeFigureOut">
               <a:rPr kumimoji="1" lang="ja-JP" altLang="en-US" smtClean="0"/>
-              <a:t>2022/7/5</a:t>
+              <a:t>2022/7/6</a:t>
             </a:fld>
             <a:endParaRPr kumimoji="1" lang="ja-JP" altLang="en-US"/>
           </a:p>
@@ -859,7 +859,7 @@
           <a:p>
             <a:fld id="{278734C7-5BF5-4A93-8E96-ED01F4D5F738}" type="datetimeFigureOut">
               <a:rPr kumimoji="1" lang="ja-JP" altLang="en-US" smtClean="0"/>
-              <a:t>2022/7/5</a:t>
+              <a:t>2022/7/6</a:t>
             </a:fld>
             <a:endParaRPr kumimoji="1" lang="ja-JP" altLang="en-US"/>
           </a:p>
@@ -1105,7 +1105,7 @@
           <a:p>
             <a:fld id="{278734C7-5BF5-4A93-8E96-ED01F4D5F738}" type="datetimeFigureOut">
               <a:rPr kumimoji="1" lang="ja-JP" altLang="en-US" smtClean="0"/>
-              <a:t>2022/7/5</a:t>
+              <a:t>2022/7/6</a:t>
             </a:fld>
             <a:endParaRPr kumimoji="1" lang="ja-JP" altLang="en-US"/>
           </a:p>
@@ -1401,7 +1401,7 @@
           <a:p>
             <a:fld id="{278734C7-5BF5-4A93-8E96-ED01F4D5F738}" type="datetimeFigureOut">
               <a:rPr kumimoji="1" lang="ja-JP" altLang="en-US" smtClean="0"/>
-              <a:t>2022/7/5</a:t>
+              <a:t>2022/7/6</a:t>
             </a:fld>
             <a:endParaRPr kumimoji="1" lang="ja-JP" altLang="en-US"/>
           </a:p>
@@ -1832,7 +1832,7 @@
           <a:p>
             <a:fld id="{278734C7-5BF5-4A93-8E96-ED01F4D5F738}" type="datetimeFigureOut">
               <a:rPr kumimoji="1" lang="ja-JP" altLang="en-US" smtClean="0"/>
-              <a:t>2022/7/5</a:t>
+              <a:t>2022/7/6</a:t>
             </a:fld>
             <a:endParaRPr kumimoji="1" lang="ja-JP" altLang="en-US"/>
           </a:p>
@@ -1950,7 +1950,7 @@
           <a:p>
             <a:fld id="{278734C7-5BF5-4A93-8E96-ED01F4D5F738}" type="datetimeFigureOut">
               <a:rPr kumimoji="1" lang="ja-JP" altLang="en-US" smtClean="0"/>
-              <a:t>2022/7/5</a:t>
+              <a:t>2022/7/6</a:t>
             </a:fld>
             <a:endParaRPr kumimoji="1" lang="ja-JP" altLang="en-US"/>
           </a:p>
@@ -2045,7 +2045,7 @@
           <a:p>
             <a:fld id="{278734C7-5BF5-4A93-8E96-ED01F4D5F738}" type="datetimeFigureOut">
               <a:rPr kumimoji="1" lang="ja-JP" altLang="en-US" smtClean="0"/>
-              <a:t>2022/7/5</a:t>
+              <a:t>2022/7/6</a:t>
             </a:fld>
             <a:endParaRPr kumimoji="1" lang="ja-JP" altLang="en-US"/>
           </a:p>
@@ -2354,7 +2354,7 @@
           <a:p>
             <a:fld id="{278734C7-5BF5-4A93-8E96-ED01F4D5F738}" type="datetimeFigureOut">
               <a:rPr kumimoji="1" lang="ja-JP" altLang="en-US" smtClean="0"/>
-              <a:t>2022/7/5</a:t>
+              <a:t>2022/7/6</a:t>
             </a:fld>
             <a:endParaRPr kumimoji="1" lang="ja-JP" altLang="en-US"/>
           </a:p>
@@ -2607,7 +2607,7 @@
           <a:p>
             <a:fld id="{278734C7-5BF5-4A93-8E96-ED01F4D5F738}" type="datetimeFigureOut">
               <a:rPr kumimoji="1" lang="ja-JP" altLang="en-US" smtClean="0"/>
-              <a:t>2022/7/5</a:t>
+              <a:t>2022/7/6</a:t>
             </a:fld>
             <a:endParaRPr kumimoji="1" lang="ja-JP" altLang="en-US"/>
           </a:p>
@@ -2852,7 +2852,7 @@
           <a:p>
             <a:fld id="{278734C7-5BF5-4A93-8E96-ED01F4D5F738}" type="datetimeFigureOut">
               <a:rPr kumimoji="1" lang="ja-JP" altLang="en-US" smtClean="0"/>
-              <a:t>2022/7/5</a:t>
+              <a:t>2022/7/6</a:t>
             </a:fld>
             <a:endParaRPr kumimoji="1" lang="ja-JP" altLang="en-US"/>
           </a:p>
@@ -5477,7 +5477,7 @@
         </p:nvGrpSpPr>
         <p:grpSpPr>
           <a:xfrm>
-            <a:off x="3890797" y="2945566"/>
+            <a:off x="2970917" y="2998407"/>
             <a:ext cx="3888000" cy="3723600"/>
             <a:chOff x="1539150" y="2357250"/>
             <a:chExt cx="3888000" cy="3723600"/>
@@ -9606,6 +9606,2071 @@
           </p:cxnSp>
         </p:grpSp>
       </p:grpSp>
+      <p:grpSp>
+        <p:nvGrpSpPr>
+          <p:cNvPr id="3" name="グループ化 2"/>
+          <p:cNvGrpSpPr/>
+          <p:nvPr/>
+        </p:nvGrpSpPr>
+        <p:grpSpPr>
+          <a:xfrm>
+            <a:off x="5629966" y="123915"/>
+            <a:ext cx="3888000" cy="3723600"/>
+            <a:chOff x="5629966" y="123915"/>
+            <a:chExt cx="3888000" cy="3723600"/>
+          </a:xfrm>
+        </p:grpSpPr>
+        <p:grpSp>
+          <p:nvGrpSpPr>
+            <p:cNvPr id="183" name="グループ化 182"/>
+            <p:cNvGrpSpPr/>
+            <p:nvPr/>
+          </p:nvGrpSpPr>
+          <p:grpSpPr>
+            <a:xfrm>
+              <a:off x="5629966" y="123915"/>
+              <a:ext cx="3888000" cy="3723600"/>
+              <a:chOff x="1539150" y="2357250"/>
+              <a:chExt cx="3888000" cy="3723600"/>
+            </a:xfrm>
+          </p:grpSpPr>
+          <p:cxnSp>
+            <p:nvCxnSpPr>
+              <p:cNvPr id="206" name="直線コネクタ 205"/>
+              <p:cNvCxnSpPr>
+                <a:stCxn id="265" idx="2"/>
+                <a:endCxn id="259" idx="0"/>
+              </p:cNvCxnSpPr>
+              <p:nvPr/>
+            </p:nvCxnSpPr>
+            <p:spPr>
+              <a:xfrm flipH="1">
+                <a:off x="1791150" y="3655199"/>
+                <a:ext cx="1220729" cy="302161"/>
+              </a:xfrm>
+              <a:prstGeom prst="line">
+                <a:avLst/>
+              </a:prstGeom>
+            </p:spPr>
+            <p:style>
+              <a:lnRef idx="1">
+                <a:schemeClr val="dk1"/>
+              </a:lnRef>
+              <a:fillRef idx="0">
+                <a:schemeClr val="dk1"/>
+              </a:fillRef>
+              <a:effectRef idx="0">
+                <a:schemeClr val="dk1"/>
+              </a:effectRef>
+              <a:fontRef idx="minor">
+                <a:schemeClr val="tx1"/>
+              </a:fontRef>
+            </p:style>
+          </p:cxnSp>
+          <p:cxnSp>
+            <p:nvCxnSpPr>
+              <p:cNvPr id="217" name="直線コネクタ 216"/>
+              <p:cNvCxnSpPr>
+                <a:stCxn id="266" idx="2"/>
+                <a:endCxn id="260" idx="0"/>
+              </p:cNvCxnSpPr>
+              <p:nvPr/>
+            </p:nvCxnSpPr>
+            <p:spPr>
+              <a:xfrm flipH="1">
+                <a:off x="2367150" y="3655199"/>
+                <a:ext cx="788729" cy="302161"/>
+              </a:xfrm>
+              <a:prstGeom prst="line">
+                <a:avLst/>
+              </a:prstGeom>
+            </p:spPr>
+            <p:style>
+              <a:lnRef idx="1">
+                <a:schemeClr val="dk1"/>
+              </a:lnRef>
+              <a:fillRef idx="0">
+                <a:schemeClr val="dk1"/>
+              </a:fillRef>
+              <a:effectRef idx="0">
+                <a:schemeClr val="dk1"/>
+              </a:effectRef>
+              <a:fontRef idx="minor">
+                <a:schemeClr val="tx1"/>
+              </a:fontRef>
+            </p:style>
+          </p:cxnSp>
+          <p:cxnSp>
+            <p:nvCxnSpPr>
+              <p:cNvPr id="218" name="直線コネクタ 217"/>
+              <p:cNvCxnSpPr>
+                <a:stCxn id="267" idx="2"/>
+                <a:endCxn id="261" idx="0"/>
+              </p:cNvCxnSpPr>
+              <p:nvPr/>
+            </p:nvCxnSpPr>
+            <p:spPr>
+              <a:xfrm flipH="1">
+                <a:off x="2943150" y="3655199"/>
+                <a:ext cx="354503" cy="302161"/>
+              </a:xfrm>
+              <a:prstGeom prst="line">
+                <a:avLst/>
+              </a:prstGeom>
+            </p:spPr>
+            <p:style>
+              <a:lnRef idx="1">
+                <a:schemeClr val="dk1"/>
+              </a:lnRef>
+              <a:fillRef idx="0">
+                <a:schemeClr val="dk1"/>
+              </a:fillRef>
+              <a:effectRef idx="0">
+                <a:schemeClr val="dk1"/>
+              </a:effectRef>
+              <a:fontRef idx="minor">
+                <a:schemeClr val="tx1"/>
+              </a:fontRef>
+            </p:style>
+          </p:cxnSp>
+          <p:cxnSp>
+            <p:nvCxnSpPr>
+              <p:cNvPr id="219" name="直線コネクタ 218"/>
+              <p:cNvCxnSpPr>
+                <a:stCxn id="268" idx="2"/>
+                <a:endCxn id="256" idx="0"/>
+              </p:cNvCxnSpPr>
+              <p:nvPr/>
+            </p:nvCxnSpPr>
+            <p:spPr>
+              <a:xfrm>
+                <a:off x="3668646" y="3655199"/>
+                <a:ext cx="354504" cy="302161"/>
+              </a:xfrm>
+              <a:prstGeom prst="line">
+                <a:avLst/>
+              </a:prstGeom>
+            </p:spPr>
+            <p:style>
+              <a:lnRef idx="1">
+                <a:schemeClr val="dk1"/>
+              </a:lnRef>
+              <a:fillRef idx="0">
+                <a:schemeClr val="dk1"/>
+              </a:fillRef>
+              <a:effectRef idx="0">
+                <a:schemeClr val="dk1"/>
+              </a:effectRef>
+              <a:fontRef idx="minor">
+                <a:schemeClr val="tx1"/>
+              </a:fontRef>
+            </p:style>
+          </p:cxnSp>
+          <p:cxnSp>
+            <p:nvCxnSpPr>
+              <p:cNvPr id="220" name="直線コネクタ 219"/>
+              <p:cNvCxnSpPr>
+                <a:stCxn id="269" idx="2"/>
+                <a:endCxn id="257" idx="0"/>
+              </p:cNvCxnSpPr>
+              <p:nvPr/>
+            </p:nvCxnSpPr>
+            <p:spPr>
+              <a:xfrm>
+                <a:off x="3812646" y="3655199"/>
+                <a:ext cx="786504" cy="302161"/>
+              </a:xfrm>
+              <a:prstGeom prst="line">
+                <a:avLst/>
+              </a:prstGeom>
+            </p:spPr>
+            <p:style>
+              <a:lnRef idx="1">
+                <a:schemeClr val="dk1"/>
+              </a:lnRef>
+              <a:fillRef idx="0">
+                <a:schemeClr val="dk1"/>
+              </a:fillRef>
+              <a:effectRef idx="0">
+                <a:schemeClr val="dk1"/>
+              </a:effectRef>
+              <a:fontRef idx="minor">
+                <a:schemeClr val="tx1"/>
+              </a:fontRef>
+            </p:style>
+          </p:cxnSp>
+          <p:cxnSp>
+            <p:nvCxnSpPr>
+              <p:cNvPr id="221" name="直線コネクタ 220"/>
+              <p:cNvCxnSpPr>
+                <a:stCxn id="270" idx="2"/>
+                <a:endCxn id="258" idx="0"/>
+              </p:cNvCxnSpPr>
+              <p:nvPr/>
+            </p:nvCxnSpPr>
+            <p:spPr>
+              <a:xfrm>
+                <a:off x="3954420" y="3655199"/>
+                <a:ext cx="1220730" cy="302161"/>
+              </a:xfrm>
+              <a:prstGeom prst="line">
+                <a:avLst/>
+              </a:prstGeom>
+            </p:spPr>
+            <p:style>
+              <a:lnRef idx="1">
+                <a:schemeClr val="dk1"/>
+              </a:lnRef>
+              <a:fillRef idx="0">
+                <a:schemeClr val="dk1"/>
+              </a:fillRef>
+              <a:effectRef idx="0">
+                <a:schemeClr val="dk1"/>
+              </a:effectRef>
+              <a:fontRef idx="minor">
+                <a:schemeClr val="tx1"/>
+              </a:fontRef>
+            </p:style>
+          </p:cxnSp>
+          <p:grpSp>
+            <p:nvGrpSpPr>
+              <p:cNvPr id="222" name="グループ化 221"/>
+              <p:cNvGrpSpPr/>
+              <p:nvPr/>
+            </p:nvGrpSpPr>
+            <p:grpSpPr>
+              <a:xfrm>
+                <a:off x="2939879" y="3115199"/>
+                <a:ext cx="1086541" cy="540000"/>
+                <a:chOff x="3521684" y="2836483"/>
+                <a:chExt cx="1086541" cy="540000"/>
+              </a:xfrm>
+            </p:grpSpPr>
+            <p:sp>
+              <p:nvSpPr>
+                <p:cNvPr id="264" name="正方形/長方形 263"/>
+                <p:cNvSpPr/>
+                <p:nvPr/>
+              </p:nvSpPr>
+              <p:spPr>
+                <a:xfrm>
+                  <a:off x="3528225" y="2836483"/>
+                  <a:ext cx="1080000" cy="540000"/>
+                </a:xfrm>
+                <a:prstGeom prst="rect">
+                  <a:avLst/>
+                </a:prstGeom>
+              </p:spPr>
+              <p:style>
+                <a:lnRef idx="2">
+                  <a:schemeClr val="accent1">
+                    <a:shade val="50000"/>
+                  </a:schemeClr>
+                </a:lnRef>
+                <a:fillRef idx="1">
+                  <a:schemeClr val="accent1"/>
+                </a:fillRef>
+                <a:effectRef idx="0">
+                  <a:schemeClr val="accent1"/>
+                </a:effectRef>
+                <a:fontRef idx="minor">
+                  <a:schemeClr val="lt1"/>
+                </a:fontRef>
+              </p:style>
+              <p:txBody>
+                <a:bodyPr rtlCol="0" anchor="ctr"/>
+                <a:lstStyle/>
+                <a:p>
+                  <a:pPr algn="ctr"/>
+                  <a:r>
+                    <a:rPr lang="en-US" altLang="ja-JP" sz="1000" dirty="0" smtClean="0"/>
+                    <a:t>WAN</a:t>
+                  </a:r>
+                  <a:endParaRPr kumimoji="1" lang="ja-JP" altLang="en-US" sz="1000" dirty="0"/>
+                </a:p>
+              </p:txBody>
+            </p:sp>
+            <p:sp>
+              <p:nvSpPr>
+                <p:cNvPr id="265" name="正方形/長方形 264"/>
+                <p:cNvSpPr/>
+                <p:nvPr/>
+              </p:nvSpPr>
+              <p:spPr>
+                <a:xfrm>
+                  <a:off x="3521684" y="3232483"/>
+                  <a:ext cx="144000" cy="144000"/>
+                </a:xfrm>
+                <a:prstGeom prst="rect">
+                  <a:avLst/>
+                </a:prstGeom>
+              </p:spPr>
+              <p:style>
+                <a:lnRef idx="2">
+                  <a:schemeClr val="accent1">
+                    <a:shade val="50000"/>
+                  </a:schemeClr>
+                </a:lnRef>
+                <a:fillRef idx="1">
+                  <a:schemeClr val="accent1"/>
+                </a:fillRef>
+                <a:effectRef idx="0">
+                  <a:schemeClr val="accent1"/>
+                </a:effectRef>
+                <a:fontRef idx="minor">
+                  <a:schemeClr val="lt1"/>
+                </a:fontRef>
+              </p:style>
+              <p:txBody>
+                <a:bodyPr rtlCol="0" anchor="ctr"/>
+                <a:lstStyle/>
+                <a:p>
+                  <a:pPr algn="ctr"/>
+                  <a:endParaRPr kumimoji="1" lang="ja-JP" altLang="en-US" sz="1000"/>
+                </a:p>
+              </p:txBody>
+            </p:sp>
+            <p:sp>
+              <p:nvSpPr>
+                <p:cNvPr id="266" name="正方形/長方形 265"/>
+                <p:cNvSpPr/>
+                <p:nvPr/>
+              </p:nvSpPr>
+              <p:spPr>
+                <a:xfrm>
+                  <a:off x="3665684" y="3232483"/>
+                  <a:ext cx="144000" cy="144000"/>
+                </a:xfrm>
+                <a:prstGeom prst="rect">
+                  <a:avLst/>
+                </a:prstGeom>
+              </p:spPr>
+              <p:style>
+                <a:lnRef idx="2">
+                  <a:schemeClr val="accent1">
+                    <a:shade val="50000"/>
+                  </a:schemeClr>
+                </a:lnRef>
+                <a:fillRef idx="1">
+                  <a:schemeClr val="accent1"/>
+                </a:fillRef>
+                <a:effectRef idx="0">
+                  <a:schemeClr val="accent1"/>
+                </a:effectRef>
+                <a:fontRef idx="minor">
+                  <a:schemeClr val="lt1"/>
+                </a:fontRef>
+              </p:style>
+              <p:txBody>
+                <a:bodyPr rtlCol="0" anchor="ctr"/>
+                <a:lstStyle/>
+                <a:p>
+                  <a:pPr algn="ctr"/>
+                  <a:endParaRPr kumimoji="1" lang="ja-JP" altLang="en-US" sz="1000"/>
+                </a:p>
+              </p:txBody>
+            </p:sp>
+            <p:sp>
+              <p:nvSpPr>
+                <p:cNvPr id="267" name="正方形/長方形 266"/>
+                <p:cNvSpPr/>
+                <p:nvPr/>
+              </p:nvSpPr>
+              <p:spPr>
+                <a:xfrm>
+                  <a:off x="3807458" y="3232483"/>
+                  <a:ext cx="144000" cy="144000"/>
+                </a:xfrm>
+                <a:prstGeom prst="rect">
+                  <a:avLst/>
+                </a:prstGeom>
+              </p:spPr>
+              <p:style>
+                <a:lnRef idx="2">
+                  <a:schemeClr val="accent1">
+                    <a:shade val="50000"/>
+                  </a:schemeClr>
+                </a:lnRef>
+                <a:fillRef idx="1">
+                  <a:schemeClr val="accent1"/>
+                </a:fillRef>
+                <a:effectRef idx="0">
+                  <a:schemeClr val="accent1"/>
+                </a:effectRef>
+                <a:fontRef idx="minor">
+                  <a:schemeClr val="lt1"/>
+                </a:fontRef>
+              </p:style>
+              <p:txBody>
+                <a:bodyPr rtlCol="0" anchor="ctr"/>
+                <a:lstStyle/>
+                <a:p>
+                  <a:pPr algn="ctr"/>
+                  <a:endParaRPr kumimoji="1" lang="ja-JP" altLang="en-US" sz="1000"/>
+                </a:p>
+              </p:txBody>
+            </p:sp>
+            <p:sp>
+              <p:nvSpPr>
+                <p:cNvPr id="268" name="正方形/長方形 267"/>
+                <p:cNvSpPr/>
+                <p:nvPr/>
+              </p:nvSpPr>
+              <p:spPr>
+                <a:xfrm>
+                  <a:off x="4178451" y="3232483"/>
+                  <a:ext cx="144000" cy="144000"/>
+                </a:xfrm>
+                <a:prstGeom prst="rect">
+                  <a:avLst/>
+                </a:prstGeom>
+              </p:spPr>
+              <p:style>
+                <a:lnRef idx="2">
+                  <a:schemeClr val="accent1">
+                    <a:shade val="50000"/>
+                  </a:schemeClr>
+                </a:lnRef>
+                <a:fillRef idx="1">
+                  <a:schemeClr val="accent1"/>
+                </a:fillRef>
+                <a:effectRef idx="0">
+                  <a:schemeClr val="accent1"/>
+                </a:effectRef>
+                <a:fontRef idx="minor">
+                  <a:schemeClr val="lt1"/>
+                </a:fontRef>
+              </p:style>
+              <p:txBody>
+                <a:bodyPr rtlCol="0" anchor="ctr"/>
+                <a:lstStyle/>
+                <a:p>
+                  <a:pPr algn="ctr"/>
+                  <a:endParaRPr kumimoji="1" lang="ja-JP" altLang="en-US" sz="1000"/>
+                </a:p>
+              </p:txBody>
+            </p:sp>
+            <p:sp>
+              <p:nvSpPr>
+                <p:cNvPr id="269" name="正方形/長方形 268"/>
+                <p:cNvSpPr/>
+                <p:nvPr/>
+              </p:nvSpPr>
+              <p:spPr>
+                <a:xfrm>
+                  <a:off x="4322451" y="3232483"/>
+                  <a:ext cx="144000" cy="144000"/>
+                </a:xfrm>
+                <a:prstGeom prst="rect">
+                  <a:avLst/>
+                </a:prstGeom>
+              </p:spPr>
+              <p:style>
+                <a:lnRef idx="2">
+                  <a:schemeClr val="accent1">
+                    <a:shade val="50000"/>
+                  </a:schemeClr>
+                </a:lnRef>
+                <a:fillRef idx="1">
+                  <a:schemeClr val="accent1"/>
+                </a:fillRef>
+                <a:effectRef idx="0">
+                  <a:schemeClr val="accent1"/>
+                </a:effectRef>
+                <a:fontRef idx="minor">
+                  <a:schemeClr val="lt1"/>
+                </a:fontRef>
+              </p:style>
+              <p:txBody>
+                <a:bodyPr rtlCol="0" anchor="ctr"/>
+                <a:lstStyle/>
+                <a:p>
+                  <a:pPr algn="ctr"/>
+                  <a:endParaRPr kumimoji="1" lang="ja-JP" altLang="en-US" sz="1000"/>
+                </a:p>
+              </p:txBody>
+            </p:sp>
+            <p:sp>
+              <p:nvSpPr>
+                <p:cNvPr id="270" name="正方形/長方形 269"/>
+                <p:cNvSpPr/>
+                <p:nvPr/>
+              </p:nvSpPr>
+              <p:spPr>
+                <a:xfrm>
+                  <a:off x="4464225" y="3232483"/>
+                  <a:ext cx="144000" cy="144000"/>
+                </a:xfrm>
+                <a:prstGeom prst="rect">
+                  <a:avLst/>
+                </a:prstGeom>
+              </p:spPr>
+              <p:style>
+                <a:lnRef idx="2">
+                  <a:schemeClr val="accent1">
+                    <a:shade val="50000"/>
+                  </a:schemeClr>
+                </a:lnRef>
+                <a:fillRef idx="1">
+                  <a:schemeClr val="accent1"/>
+                </a:fillRef>
+                <a:effectRef idx="0">
+                  <a:schemeClr val="accent1"/>
+                </a:effectRef>
+                <a:fontRef idx="minor">
+                  <a:schemeClr val="lt1"/>
+                </a:fontRef>
+              </p:style>
+              <p:txBody>
+                <a:bodyPr rtlCol="0" anchor="ctr"/>
+                <a:lstStyle/>
+                <a:p>
+                  <a:pPr algn="ctr"/>
+                  <a:endParaRPr kumimoji="1" lang="ja-JP" altLang="en-US" sz="1000"/>
+                </a:p>
+              </p:txBody>
+            </p:sp>
+            <p:sp>
+              <p:nvSpPr>
+                <p:cNvPr id="271" name="正方形/長方形 270"/>
+                <p:cNvSpPr/>
+                <p:nvPr/>
+              </p:nvSpPr>
+              <p:spPr>
+                <a:xfrm>
+                  <a:off x="3996225" y="2836483"/>
+                  <a:ext cx="144000" cy="144000"/>
+                </a:xfrm>
+                <a:prstGeom prst="rect">
+                  <a:avLst/>
+                </a:prstGeom>
+              </p:spPr>
+              <p:style>
+                <a:lnRef idx="2">
+                  <a:schemeClr val="accent1">
+                    <a:shade val="50000"/>
+                  </a:schemeClr>
+                </a:lnRef>
+                <a:fillRef idx="1">
+                  <a:schemeClr val="accent1"/>
+                </a:fillRef>
+                <a:effectRef idx="0">
+                  <a:schemeClr val="accent1"/>
+                </a:effectRef>
+                <a:fontRef idx="minor">
+                  <a:schemeClr val="lt1"/>
+                </a:fontRef>
+              </p:style>
+              <p:txBody>
+                <a:bodyPr rtlCol="0" anchor="ctr"/>
+                <a:lstStyle/>
+                <a:p>
+                  <a:pPr algn="ctr"/>
+                  <a:endParaRPr kumimoji="1" lang="ja-JP" altLang="en-US" sz="1000"/>
+                </a:p>
+              </p:txBody>
+            </p:sp>
+          </p:grpSp>
+          <p:cxnSp>
+            <p:nvCxnSpPr>
+              <p:cNvPr id="223" name="直線コネクタ 222"/>
+              <p:cNvCxnSpPr>
+                <a:stCxn id="263" idx="2"/>
+                <a:endCxn id="271" idx="0"/>
+              </p:cNvCxnSpPr>
+              <p:nvPr/>
+            </p:nvCxnSpPr>
+            <p:spPr>
+              <a:xfrm>
+                <a:off x="3483150" y="2861250"/>
+                <a:ext cx="3270" cy="253949"/>
+              </a:xfrm>
+              <a:prstGeom prst="line">
+                <a:avLst/>
+              </a:prstGeom>
+            </p:spPr>
+            <p:style>
+              <a:lnRef idx="1">
+                <a:schemeClr val="dk1"/>
+              </a:lnRef>
+              <a:fillRef idx="0">
+                <a:schemeClr val="dk1"/>
+              </a:fillRef>
+              <a:effectRef idx="0">
+                <a:schemeClr val="dk1"/>
+              </a:effectRef>
+              <a:fontRef idx="minor">
+                <a:schemeClr val="tx1"/>
+              </a:fontRef>
+            </p:style>
+          </p:cxnSp>
+          <p:grpSp>
+            <p:nvGrpSpPr>
+              <p:cNvPr id="224" name="グループ化 223"/>
+              <p:cNvGrpSpPr/>
+              <p:nvPr/>
+            </p:nvGrpSpPr>
+            <p:grpSpPr>
+              <a:xfrm>
+                <a:off x="3123150" y="2357250"/>
+                <a:ext cx="720000" cy="504000"/>
+                <a:chOff x="3636225" y="757050"/>
+                <a:chExt cx="720000" cy="504000"/>
+              </a:xfrm>
+            </p:grpSpPr>
+            <p:sp>
+              <p:nvSpPr>
+                <p:cNvPr id="262" name="正方形/長方形 261"/>
+                <p:cNvSpPr/>
+                <p:nvPr/>
+              </p:nvSpPr>
+              <p:spPr>
+                <a:xfrm>
+                  <a:off x="3636225" y="757050"/>
+                  <a:ext cx="720000" cy="360000"/>
+                </a:xfrm>
+                <a:prstGeom prst="rect">
+                  <a:avLst/>
+                </a:prstGeom>
+              </p:spPr>
+              <p:style>
+                <a:lnRef idx="2">
+                  <a:schemeClr val="accent1">
+                    <a:shade val="50000"/>
+                  </a:schemeClr>
+                </a:lnRef>
+                <a:fillRef idx="1">
+                  <a:schemeClr val="accent1"/>
+                </a:fillRef>
+                <a:effectRef idx="0">
+                  <a:schemeClr val="accent1"/>
+                </a:effectRef>
+                <a:fontRef idx="minor">
+                  <a:schemeClr val="lt1"/>
+                </a:fontRef>
+              </p:style>
+              <p:txBody>
+                <a:bodyPr rtlCol="0" anchor="ctr"/>
+                <a:lstStyle/>
+                <a:p>
+                  <a:pPr algn="ctr"/>
+                  <a:r>
+                    <a:rPr lang="en-US" altLang="ja-JP" sz="1000" dirty="0" smtClean="0"/>
+                    <a:t>Witness</a:t>
+                  </a:r>
+                  <a:endParaRPr kumimoji="1" lang="ja-JP" altLang="en-US" sz="1000" dirty="0"/>
+                </a:p>
+              </p:txBody>
+            </p:sp>
+            <p:sp>
+              <p:nvSpPr>
+                <p:cNvPr id="263" name="正方形/長方形 262"/>
+                <p:cNvSpPr/>
+                <p:nvPr/>
+              </p:nvSpPr>
+              <p:spPr>
+                <a:xfrm>
+                  <a:off x="3924225" y="1117050"/>
+                  <a:ext cx="144000" cy="144000"/>
+                </a:xfrm>
+                <a:prstGeom prst="rect">
+                  <a:avLst/>
+                </a:prstGeom>
+              </p:spPr>
+              <p:style>
+                <a:lnRef idx="2">
+                  <a:schemeClr val="accent1">
+                    <a:shade val="50000"/>
+                  </a:schemeClr>
+                </a:lnRef>
+                <a:fillRef idx="1">
+                  <a:schemeClr val="accent1"/>
+                </a:fillRef>
+                <a:effectRef idx="0">
+                  <a:schemeClr val="accent1"/>
+                </a:effectRef>
+                <a:fontRef idx="minor">
+                  <a:schemeClr val="lt1"/>
+                </a:fontRef>
+              </p:style>
+              <p:txBody>
+                <a:bodyPr rtlCol="0" anchor="ctr"/>
+                <a:lstStyle/>
+                <a:p>
+                  <a:pPr algn="ctr"/>
+                  <a:endParaRPr kumimoji="1" lang="ja-JP" altLang="en-US" sz="1000"/>
+                </a:p>
+              </p:txBody>
+            </p:sp>
+          </p:grpSp>
+          <p:cxnSp>
+            <p:nvCxnSpPr>
+              <p:cNvPr id="225" name="直線コネクタ 224"/>
+              <p:cNvCxnSpPr>
+                <a:stCxn id="259" idx="2"/>
+                <a:endCxn id="236" idx="0"/>
+              </p:cNvCxnSpPr>
+              <p:nvPr/>
+            </p:nvCxnSpPr>
+            <p:spPr>
+              <a:xfrm>
+                <a:off x="1791150" y="4173360"/>
+                <a:ext cx="361500" cy="323025"/>
+              </a:xfrm>
+              <a:prstGeom prst="line">
+                <a:avLst/>
+              </a:prstGeom>
+            </p:spPr>
+            <p:style>
+              <a:lnRef idx="1">
+                <a:schemeClr val="dk1"/>
+              </a:lnRef>
+              <a:fillRef idx="0">
+                <a:schemeClr val="dk1"/>
+              </a:fillRef>
+              <a:effectRef idx="0">
+                <a:schemeClr val="dk1"/>
+              </a:effectRef>
+              <a:fontRef idx="minor">
+                <a:schemeClr val="tx1"/>
+              </a:fontRef>
+            </p:style>
+          </p:cxnSp>
+          <p:cxnSp>
+            <p:nvCxnSpPr>
+              <p:cNvPr id="226" name="直線コネクタ 225"/>
+              <p:cNvCxnSpPr>
+                <a:stCxn id="260" idx="2"/>
+                <a:endCxn id="237" idx="0"/>
+              </p:cNvCxnSpPr>
+              <p:nvPr/>
+            </p:nvCxnSpPr>
+            <p:spPr>
+              <a:xfrm>
+                <a:off x="2367150" y="4173360"/>
+                <a:ext cx="1500" cy="319696"/>
+              </a:xfrm>
+              <a:prstGeom prst="line">
+                <a:avLst/>
+              </a:prstGeom>
+            </p:spPr>
+            <p:style>
+              <a:lnRef idx="1">
+                <a:schemeClr val="dk1"/>
+              </a:lnRef>
+              <a:fillRef idx="0">
+                <a:schemeClr val="dk1"/>
+              </a:fillRef>
+              <a:effectRef idx="0">
+                <a:schemeClr val="dk1"/>
+              </a:effectRef>
+              <a:fontRef idx="minor">
+                <a:schemeClr val="tx1"/>
+              </a:fontRef>
+            </p:style>
+          </p:cxnSp>
+          <p:grpSp>
+            <p:nvGrpSpPr>
+              <p:cNvPr id="227" name="グループ化 226"/>
+              <p:cNvGrpSpPr/>
+              <p:nvPr/>
+            </p:nvGrpSpPr>
+            <p:grpSpPr>
+              <a:xfrm>
+                <a:off x="1539150" y="3957360"/>
+                <a:ext cx="1656000" cy="216000"/>
+                <a:chOff x="720000" y="3957360"/>
+                <a:chExt cx="1656000" cy="216000"/>
+              </a:xfrm>
+            </p:grpSpPr>
+            <p:sp>
+              <p:nvSpPr>
+                <p:cNvPr id="259" name="正方形/長方形 258"/>
+                <p:cNvSpPr/>
+                <p:nvPr/>
+              </p:nvSpPr>
+              <p:spPr>
+                <a:xfrm>
+                  <a:off x="720000" y="3957360"/>
+                  <a:ext cx="504000" cy="216000"/>
+                </a:xfrm>
+                <a:prstGeom prst="rect">
+                  <a:avLst/>
+                </a:prstGeom>
+              </p:spPr>
+              <p:style>
+                <a:lnRef idx="2">
+                  <a:schemeClr val="accent1">
+                    <a:shade val="50000"/>
+                  </a:schemeClr>
+                </a:lnRef>
+                <a:fillRef idx="1">
+                  <a:schemeClr val="accent1"/>
+                </a:fillRef>
+                <a:effectRef idx="0">
+                  <a:schemeClr val="accent1"/>
+                </a:effectRef>
+                <a:fontRef idx="minor">
+                  <a:schemeClr val="lt1"/>
+                </a:fontRef>
+              </p:style>
+              <p:txBody>
+                <a:bodyPr rtlCol="0" anchor="ctr"/>
+                <a:lstStyle/>
+                <a:p>
+                  <a:pPr algn="ctr"/>
+                  <a:r>
+                    <a:rPr lang="en-US" altLang="ja-JP" sz="1000" dirty="0" smtClean="0"/>
+                    <a:t>SW#1</a:t>
+                  </a:r>
+                  <a:endParaRPr kumimoji="1" lang="ja-JP" altLang="en-US" sz="1000" dirty="0"/>
+                </a:p>
+              </p:txBody>
+            </p:sp>
+            <p:sp>
+              <p:nvSpPr>
+                <p:cNvPr id="260" name="正方形/長方形 259"/>
+                <p:cNvSpPr/>
+                <p:nvPr/>
+              </p:nvSpPr>
+              <p:spPr>
+                <a:xfrm>
+                  <a:off x="1296000" y="3957360"/>
+                  <a:ext cx="504000" cy="216000"/>
+                </a:xfrm>
+                <a:prstGeom prst="rect">
+                  <a:avLst/>
+                </a:prstGeom>
+              </p:spPr>
+              <p:style>
+                <a:lnRef idx="2">
+                  <a:schemeClr val="accent1">
+                    <a:shade val="50000"/>
+                  </a:schemeClr>
+                </a:lnRef>
+                <a:fillRef idx="1">
+                  <a:schemeClr val="accent1"/>
+                </a:fillRef>
+                <a:effectRef idx="0">
+                  <a:schemeClr val="accent1"/>
+                </a:effectRef>
+                <a:fontRef idx="minor">
+                  <a:schemeClr val="lt1"/>
+                </a:fontRef>
+              </p:style>
+              <p:txBody>
+                <a:bodyPr rtlCol="0" anchor="ctr"/>
+                <a:lstStyle/>
+                <a:p>
+                  <a:pPr algn="ctr"/>
+                  <a:r>
+                    <a:rPr lang="en-US" altLang="ja-JP" sz="1000" dirty="0" smtClean="0"/>
+                    <a:t>SW#2</a:t>
+                  </a:r>
+                  <a:endParaRPr kumimoji="1" lang="ja-JP" altLang="en-US" sz="1000" dirty="0"/>
+                </a:p>
+              </p:txBody>
+            </p:sp>
+            <p:sp>
+              <p:nvSpPr>
+                <p:cNvPr id="261" name="正方形/長方形 260"/>
+                <p:cNvSpPr/>
+                <p:nvPr/>
+              </p:nvSpPr>
+              <p:spPr>
+                <a:xfrm>
+                  <a:off x="1872000" y="3957360"/>
+                  <a:ext cx="504000" cy="216000"/>
+                </a:xfrm>
+                <a:prstGeom prst="rect">
+                  <a:avLst/>
+                </a:prstGeom>
+              </p:spPr>
+              <p:style>
+                <a:lnRef idx="2">
+                  <a:schemeClr val="accent1">
+                    <a:shade val="50000"/>
+                  </a:schemeClr>
+                </a:lnRef>
+                <a:fillRef idx="1">
+                  <a:schemeClr val="accent1"/>
+                </a:fillRef>
+                <a:effectRef idx="0">
+                  <a:schemeClr val="accent1"/>
+                </a:effectRef>
+                <a:fontRef idx="minor">
+                  <a:schemeClr val="lt1"/>
+                </a:fontRef>
+              </p:style>
+              <p:txBody>
+                <a:bodyPr rtlCol="0" anchor="ctr"/>
+                <a:lstStyle/>
+                <a:p>
+                  <a:pPr algn="ctr"/>
+                  <a:r>
+                    <a:rPr lang="en-US" altLang="ja-JP" sz="1000" dirty="0" smtClean="0"/>
+                    <a:t>SW#3</a:t>
+                  </a:r>
+                  <a:endParaRPr kumimoji="1" lang="ja-JP" altLang="en-US" sz="1000" dirty="0"/>
+                </a:p>
+              </p:txBody>
+            </p:sp>
+          </p:grpSp>
+          <p:cxnSp>
+            <p:nvCxnSpPr>
+              <p:cNvPr id="228" name="直線コネクタ 227"/>
+              <p:cNvCxnSpPr>
+                <a:stCxn id="261" idx="2"/>
+                <a:endCxn id="238" idx="0"/>
+              </p:cNvCxnSpPr>
+              <p:nvPr/>
+            </p:nvCxnSpPr>
+            <p:spPr>
+              <a:xfrm flipH="1">
+                <a:off x="2584650" y="4173360"/>
+                <a:ext cx="358500" cy="320547"/>
+              </a:xfrm>
+              <a:prstGeom prst="line">
+                <a:avLst/>
+              </a:prstGeom>
+            </p:spPr>
+            <p:style>
+              <a:lnRef idx="1">
+                <a:schemeClr val="dk1"/>
+              </a:lnRef>
+              <a:fillRef idx="0">
+                <a:schemeClr val="dk1"/>
+              </a:fillRef>
+              <a:effectRef idx="0">
+                <a:schemeClr val="dk1"/>
+              </a:effectRef>
+              <a:fontRef idx="minor">
+                <a:schemeClr val="tx1"/>
+              </a:fontRef>
+            </p:style>
+          </p:cxnSp>
+          <p:cxnSp>
+            <p:nvCxnSpPr>
+              <p:cNvPr id="229" name="直線コネクタ 228"/>
+              <p:cNvCxnSpPr>
+                <a:stCxn id="256" idx="2"/>
+                <a:endCxn id="243" idx="0"/>
+              </p:cNvCxnSpPr>
+              <p:nvPr/>
+            </p:nvCxnSpPr>
+            <p:spPr>
+              <a:xfrm>
+                <a:off x="4023150" y="4173360"/>
+                <a:ext cx="360000" cy="323025"/>
+              </a:xfrm>
+              <a:prstGeom prst="line">
+                <a:avLst/>
+              </a:prstGeom>
+            </p:spPr>
+            <p:style>
+              <a:lnRef idx="1">
+                <a:schemeClr val="dk1"/>
+              </a:lnRef>
+              <a:fillRef idx="0">
+                <a:schemeClr val="dk1"/>
+              </a:fillRef>
+              <a:effectRef idx="0">
+                <a:schemeClr val="dk1"/>
+              </a:effectRef>
+              <a:fontRef idx="minor">
+                <a:schemeClr val="tx1"/>
+              </a:fontRef>
+            </p:style>
+          </p:cxnSp>
+          <p:cxnSp>
+            <p:nvCxnSpPr>
+              <p:cNvPr id="230" name="直線コネクタ 229"/>
+              <p:cNvCxnSpPr>
+                <a:stCxn id="257" idx="2"/>
+                <a:endCxn id="244" idx="0"/>
+              </p:cNvCxnSpPr>
+              <p:nvPr/>
+            </p:nvCxnSpPr>
+            <p:spPr>
+              <a:xfrm>
+                <a:off x="4599150" y="4173360"/>
+                <a:ext cx="0" cy="319696"/>
+              </a:xfrm>
+              <a:prstGeom prst="line">
+                <a:avLst/>
+              </a:prstGeom>
+            </p:spPr>
+            <p:style>
+              <a:lnRef idx="1">
+                <a:schemeClr val="dk1"/>
+              </a:lnRef>
+              <a:fillRef idx="0">
+                <a:schemeClr val="dk1"/>
+              </a:fillRef>
+              <a:effectRef idx="0">
+                <a:schemeClr val="dk1"/>
+              </a:effectRef>
+              <a:fontRef idx="minor">
+                <a:schemeClr val="tx1"/>
+              </a:fontRef>
+            </p:style>
+          </p:cxnSp>
+          <p:grpSp>
+            <p:nvGrpSpPr>
+              <p:cNvPr id="231" name="グループ化 230"/>
+              <p:cNvGrpSpPr/>
+              <p:nvPr/>
+            </p:nvGrpSpPr>
+            <p:grpSpPr>
+              <a:xfrm>
+                <a:off x="3771150" y="3957360"/>
+                <a:ext cx="1656000" cy="216000"/>
+                <a:chOff x="5040000" y="3957360"/>
+                <a:chExt cx="1656000" cy="216000"/>
+              </a:xfrm>
+            </p:grpSpPr>
+            <p:sp>
+              <p:nvSpPr>
+                <p:cNvPr id="256" name="正方形/長方形 255"/>
+                <p:cNvSpPr/>
+                <p:nvPr/>
+              </p:nvSpPr>
+              <p:spPr>
+                <a:xfrm>
+                  <a:off x="5040000" y="3957360"/>
+                  <a:ext cx="504000" cy="216000"/>
+                </a:xfrm>
+                <a:prstGeom prst="rect">
+                  <a:avLst/>
+                </a:prstGeom>
+              </p:spPr>
+              <p:style>
+                <a:lnRef idx="2">
+                  <a:schemeClr val="accent1">
+                    <a:shade val="50000"/>
+                  </a:schemeClr>
+                </a:lnRef>
+                <a:fillRef idx="1">
+                  <a:schemeClr val="accent1"/>
+                </a:fillRef>
+                <a:effectRef idx="0">
+                  <a:schemeClr val="accent1"/>
+                </a:effectRef>
+                <a:fontRef idx="minor">
+                  <a:schemeClr val="lt1"/>
+                </a:fontRef>
+              </p:style>
+              <p:txBody>
+                <a:bodyPr rtlCol="0" anchor="ctr"/>
+                <a:lstStyle/>
+                <a:p>
+                  <a:pPr algn="ctr"/>
+                  <a:r>
+                    <a:rPr lang="en-US" altLang="ja-JP" sz="1000" dirty="0" smtClean="0"/>
+                    <a:t>SW#4</a:t>
+                  </a:r>
+                  <a:endParaRPr kumimoji="1" lang="ja-JP" altLang="en-US" sz="1000" dirty="0"/>
+                </a:p>
+              </p:txBody>
+            </p:sp>
+            <p:sp>
+              <p:nvSpPr>
+                <p:cNvPr id="257" name="正方形/長方形 256"/>
+                <p:cNvSpPr/>
+                <p:nvPr/>
+              </p:nvSpPr>
+              <p:spPr>
+                <a:xfrm>
+                  <a:off x="5616000" y="3957360"/>
+                  <a:ext cx="504000" cy="216000"/>
+                </a:xfrm>
+                <a:prstGeom prst="rect">
+                  <a:avLst/>
+                </a:prstGeom>
+              </p:spPr>
+              <p:style>
+                <a:lnRef idx="2">
+                  <a:schemeClr val="accent1">
+                    <a:shade val="50000"/>
+                  </a:schemeClr>
+                </a:lnRef>
+                <a:fillRef idx="1">
+                  <a:schemeClr val="accent1"/>
+                </a:fillRef>
+                <a:effectRef idx="0">
+                  <a:schemeClr val="accent1"/>
+                </a:effectRef>
+                <a:fontRef idx="minor">
+                  <a:schemeClr val="lt1"/>
+                </a:fontRef>
+              </p:style>
+              <p:txBody>
+                <a:bodyPr rtlCol="0" anchor="ctr"/>
+                <a:lstStyle/>
+                <a:p>
+                  <a:pPr algn="ctr"/>
+                  <a:r>
+                    <a:rPr lang="en-US" altLang="ja-JP" sz="1000" dirty="0" smtClean="0"/>
+                    <a:t>SW#5</a:t>
+                  </a:r>
+                  <a:endParaRPr kumimoji="1" lang="ja-JP" altLang="en-US" sz="1000" dirty="0"/>
+                </a:p>
+              </p:txBody>
+            </p:sp>
+            <p:sp>
+              <p:nvSpPr>
+                <p:cNvPr id="258" name="正方形/長方形 257"/>
+                <p:cNvSpPr/>
+                <p:nvPr/>
+              </p:nvSpPr>
+              <p:spPr>
+                <a:xfrm>
+                  <a:off x="6192000" y="3957360"/>
+                  <a:ext cx="504000" cy="216000"/>
+                </a:xfrm>
+                <a:prstGeom prst="rect">
+                  <a:avLst/>
+                </a:prstGeom>
+              </p:spPr>
+              <p:style>
+                <a:lnRef idx="2">
+                  <a:schemeClr val="accent1">
+                    <a:shade val="50000"/>
+                  </a:schemeClr>
+                </a:lnRef>
+                <a:fillRef idx="1">
+                  <a:schemeClr val="accent1"/>
+                </a:fillRef>
+                <a:effectRef idx="0">
+                  <a:schemeClr val="accent1"/>
+                </a:effectRef>
+                <a:fontRef idx="minor">
+                  <a:schemeClr val="lt1"/>
+                </a:fontRef>
+              </p:style>
+              <p:txBody>
+                <a:bodyPr rtlCol="0" anchor="ctr"/>
+                <a:lstStyle/>
+                <a:p>
+                  <a:pPr algn="ctr"/>
+                  <a:r>
+                    <a:rPr lang="en-US" altLang="ja-JP" sz="1000" dirty="0" smtClean="0"/>
+                    <a:t>SW#6</a:t>
+                  </a:r>
+                  <a:endParaRPr kumimoji="1" lang="ja-JP" altLang="en-US" sz="1000" dirty="0"/>
+                </a:p>
+              </p:txBody>
+            </p:sp>
+          </p:grpSp>
+          <p:cxnSp>
+            <p:nvCxnSpPr>
+              <p:cNvPr id="232" name="直線コネクタ 231"/>
+              <p:cNvCxnSpPr>
+                <a:stCxn id="258" idx="2"/>
+                <a:endCxn id="245" idx="0"/>
+              </p:cNvCxnSpPr>
+              <p:nvPr/>
+            </p:nvCxnSpPr>
+            <p:spPr>
+              <a:xfrm flipH="1">
+                <a:off x="4815150" y="4173360"/>
+                <a:ext cx="360000" cy="320547"/>
+              </a:xfrm>
+              <a:prstGeom prst="line">
+                <a:avLst/>
+              </a:prstGeom>
+            </p:spPr>
+            <p:style>
+              <a:lnRef idx="1">
+                <a:schemeClr val="dk1"/>
+              </a:lnRef>
+              <a:fillRef idx="0">
+                <a:schemeClr val="dk1"/>
+              </a:fillRef>
+              <a:effectRef idx="0">
+                <a:schemeClr val="dk1"/>
+              </a:effectRef>
+              <a:fontRef idx="minor">
+                <a:schemeClr val="tx1"/>
+              </a:fontRef>
+            </p:style>
+          </p:cxnSp>
+          <p:grpSp>
+            <p:nvGrpSpPr>
+              <p:cNvPr id="233" name="グループ化 232"/>
+              <p:cNvGrpSpPr/>
+              <p:nvPr/>
+            </p:nvGrpSpPr>
+            <p:grpSpPr>
+              <a:xfrm>
+                <a:off x="1540650" y="4493056"/>
+                <a:ext cx="3670500" cy="1587794"/>
+                <a:chOff x="1540650" y="4674031"/>
+                <a:chExt cx="3670500" cy="1587794"/>
+              </a:xfrm>
+            </p:grpSpPr>
+            <p:sp>
+              <p:nvSpPr>
+                <p:cNvPr id="234" name="正方形/長方形 233"/>
+                <p:cNvSpPr/>
+                <p:nvPr/>
+              </p:nvSpPr>
+              <p:spPr>
+                <a:xfrm>
+                  <a:off x="1540650" y="4821825"/>
+                  <a:ext cx="1440000" cy="1440000"/>
+                </a:xfrm>
+                <a:prstGeom prst="rect">
+                  <a:avLst/>
+                </a:prstGeom>
+                <a:ln>
+                  <a:solidFill>
+                    <a:schemeClr val="accent1"/>
+                  </a:solidFill>
+                </a:ln>
+              </p:spPr>
+              <p:style>
+                <a:lnRef idx="2">
+                  <a:schemeClr val="accent3">
+                    <a:shade val="50000"/>
+                  </a:schemeClr>
+                </a:lnRef>
+                <a:fillRef idx="1">
+                  <a:schemeClr val="accent3"/>
+                </a:fillRef>
+                <a:effectRef idx="0">
+                  <a:schemeClr val="accent3"/>
+                </a:effectRef>
+                <a:fontRef idx="minor">
+                  <a:schemeClr val="lt1"/>
+                </a:fontRef>
+              </p:style>
+              <p:txBody>
+                <a:bodyPr rtlCol="0" anchor="b" anchorCtr="0"/>
+                <a:lstStyle/>
+                <a:p>
+                  <a:pPr algn="ctr"/>
+                  <a:r>
+                    <a:rPr kumimoji="1" lang="en-US" altLang="ja-JP" sz="1000" dirty="0" smtClean="0"/>
+                    <a:t>PM#1</a:t>
+                  </a:r>
+                  <a:endParaRPr kumimoji="1" lang="ja-JP" altLang="en-US" sz="1000" dirty="0"/>
+                </a:p>
+              </p:txBody>
+            </p:sp>
+            <p:grpSp>
+              <p:nvGrpSpPr>
+                <p:cNvPr id="235" name="グループ化 234"/>
+                <p:cNvGrpSpPr/>
+                <p:nvPr/>
+              </p:nvGrpSpPr>
+              <p:grpSpPr>
+                <a:xfrm>
+                  <a:off x="1900650" y="5289825"/>
+                  <a:ext cx="720000" cy="504000"/>
+                  <a:chOff x="4320000" y="2767876"/>
+                  <a:chExt cx="720000" cy="504000"/>
+                </a:xfrm>
+              </p:grpSpPr>
+              <p:sp>
+                <p:nvSpPr>
+                  <p:cNvPr id="252" name="正方形/長方形 251"/>
+                  <p:cNvSpPr/>
+                  <p:nvPr/>
+                </p:nvSpPr>
+                <p:spPr>
+                  <a:xfrm>
+                    <a:off x="4320000" y="2911876"/>
+                    <a:ext cx="720000" cy="360000"/>
+                  </a:xfrm>
+                  <a:prstGeom prst="rect">
+                    <a:avLst/>
+                  </a:prstGeom>
+                </p:spPr>
+                <p:style>
+                  <a:lnRef idx="2">
+                    <a:schemeClr val="accent1">
+                      <a:shade val="50000"/>
+                    </a:schemeClr>
+                  </a:lnRef>
+                  <a:fillRef idx="1">
+                    <a:schemeClr val="accent1"/>
+                  </a:fillRef>
+                  <a:effectRef idx="0">
+                    <a:schemeClr val="accent1"/>
+                  </a:effectRef>
+                  <a:fontRef idx="minor">
+                    <a:schemeClr val="lt1"/>
+                  </a:fontRef>
+                </p:style>
+                <p:txBody>
+                  <a:bodyPr rtlCol="0" anchor="ctr"/>
+                  <a:lstStyle/>
+                  <a:p>
+                    <a:pPr algn="ctr"/>
+                    <a:r>
+                      <a:rPr kumimoji="1" lang="en-US" altLang="ja-JP" sz="1000" dirty="0" smtClean="0"/>
+                      <a:t>VM#1</a:t>
+                    </a:r>
+                    <a:endParaRPr kumimoji="1" lang="ja-JP" altLang="en-US" sz="1000" dirty="0"/>
+                  </a:p>
+                </p:txBody>
+              </p:sp>
+              <p:grpSp>
+                <p:nvGrpSpPr>
+                  <p:cNvPr id="253" name="グループ化 252"/>
+                  <p:cNvGrpSpPr/>
+                  <p:nvPr/>
+                </p:nvGrpSpPr>
+                <p:grpSpPr>
+                  <a:xfrm>
+                    <a:off x="4500000" y="2767876"/>
+                    <a:ext cx="360000" cy="144000"/>
+                    <a:chOff x="5400000" y="2767876"/>
+                    <a:chExt cx="360000" cy="144000"/>
+                  </a:xfrm>
+                </p:grpSpPr>
+                <p:sp>
+                  <p:nvSpPr>
+                    <p:cNvPr id="254" name="正方形/長方形 253"/>
+                    <p:cNvSpPr/>
+                    <p:nvPr/>
+                  </p:nvSpPr>
+                  <p:spPr>
+                    <a:xfrm>
+                      <a:off x="5400000" y="2767876"/>
+                      <a:ext cx="144000" cy="144000"/>
+                    </a:xfrm>
+                    <a:prstGeom prst="rect">
+                      <a:avLst/>
+                    </a:prstGeom>
+                  </p:spPr>
+                  <p:style>
+                    <a:lnRef idx="2">
+                      <a:schemeClr val="accent1">
+                        <a:shade val="50000"/>
+                      </a:schemeClr>
+                    </a:lnRef>
+                    <a:fillRef idx="1">
+                      <a:schemeClr val="accent1"/>
+                    </a:fillRef>
+                    <a:effectRef idx="0">
+                      <a:schemeClr val="accent1"/>
+                    </a:effectRef>
+                    <a:fontRef idx="minor">
+                      <a:schemeClr val="lt1"/>
+                    </a:fontRef>
+                  </p:style>
+                  <p:txBody>
+                    <a:bodyPr rtlCol="0" anchor="ctr"/>
+                    <a:lstStyle/>
+                    <a:p>
+                      <a:pPr algn="ctr"/>
+                      <a:endParaRPr kumimoji="1" lang="ja-JP" altLang="en-US" sz="1000"/>
+                    </a:p>
+                  </p:txBody>
+                </p:sp>
+                <p:sp>
+                  <p:nvSpPr>
+                    <p:cNvPr id="255" name="正方形/長方形 254"/>
+                    <p:cNvSpPr/>
+                    <p:nvPr/>
+                  </p:nvSpPr>
+                  <p:spPr>
+                    <a:xfrm>
+                      <a:off x="5616000" y="2767876"/>
+                      <a:ext cx="144000" cy="144000"/>
+                    </a:xfrm>
+                    <a:prstGeom prst="rect">
+                      <a:avLst/>
+                    </a:prstGeom>
+                  </p:spPr>
+                  <p:style>
+                    <a:lnRef idx="2">
+                      <a:schemeClr val="accent1">
+                        <a:shade val="50000"/>
+                      </a:schemeClr>
+                    </a:lnRef>
+                    <a:fillRef idx="1">
+                      <a:schemeClr val="accent1"/>
+                    </a:fillRef>
+                    <a:effectRef idx="0">
+                      <a:schemeClr val="accent1"/>
+                    </a:effectRef>
+                    <a:fontRef idx="minor">
+                      <a:schemeClr val="lt1"/>
+                    </a:fontRef>
+                  </p:style>
+                  <p:txBody>
+                    <a:bodyPr rtlCol="0" anchor="ctr"/>
+                    <a:lstStyle/>
+                    <a:p>
+                      <a:pPr algn="ctr"/>
+                      <a:endParaRPr kumimoji="1" lang="ja-JP" altLang="en-US" sz="1000"/>
+                    </a:p>
+                  </p:txBody>
+                </p:sp>
+              </p:grpSp>
+            </p:grpSp>
+            <p:sp>
+              <p:nvSpPr>
+                <p:cNvPr id="236" name="正方形/長方形 235"/>
+                <p:cNvSpPr/>
+                <p:nvPr/>
+              </p:nvSpPr>
+              <p:spPr>
+                <a:xfrm>
+                  <a:off x="2080650" y="4677360"/>
+                  <a:ext cx="144000" cy="144000"/>
+                </a:xfrm>
+                <a:prstGeom prst="rect">
+                  <a:avLst/>
+                </a:prstGeom>
+              </p:spPr>
+              <p:style>
+                <a:lnRef idx="2">
+                  <a:schemeClr val="accent1">
+                    <a:shade val="50000"/>
+                  </a:schemeClr>
+                </a:lnRef>
+                <a:fillRef idx="1">
+                  <a:schemeClr val="accent1"/>
+                </a:fillRef>
+                <a:effectRef idx="0">
+                  <a:schemeClr val="accent1"/>
+                </a:effectRef>
+                <a:fontRef idx="minor">
+                  <a:schemeClr val="lt1"/>
+                </a:fontRef>
+              </p:style>
+              <p:txBody>
+                <a:bodyPr rtlCol="0" anchor="ctr"/>
+                <a:lstStyle/>
+                <a:p>
+                  <a:pPr algn="ctr"/>
+                  <a:r>
+                    <a:rPr kumimoji="1" lang="en-US" altLang="ja-JP" sz="1000" dirty="0" smtClean="0"/>
+                    <a:t>1</a:t>
+                  </a:r>
+                  <a:endParaRPr kumimoji="1" lang="ja-JP" altLang="en-US" sz="1000" dirty="0"/>
+                </a:p>
+              </p:txBody>
+            </p:sp>
+            <p:sp>
+              <p:nvSpPr>
+                <p:cNvPr id="237" name="正方形/長方形 236"/>
+                <p:cNvSpPr/>
+                <p:nvPr/>
+              </p:nvSpPr>
+              <p:spPr>
+                <a:xfrm>
+                  <a:off x="2296650" y="4674031"/>
+                  <a:ext cx="144000" cy="144000"/>
+                </a:xfrm>
+                <a:prstGeom prst="rect">
+                  <a:avLst/>
+                </a:prstGeom>
+              </p:spPr>
+              <p:style>
+                <a:lnRef idx="2">
+                  <a:schemeClr val="accent1">
+                    <a:shade val="50000"/>
+                  </a:schemeClr>
+                </a:lnRef>
+                <a:fillRef idx="1">
+                  <a:schemeClr val="accent1"/>
+                </a:fillRef>
+                <a:effectRef idx="0">
+                  <a:schemeClr val="accent1"/>
+                </a:effectRef>
+                <a:fontRef idx="minor">
+                  <a:schemeClr val="lt1"/>
+                </a:fontRef>
+              </p:style>
+              <p:txBody>
+                <a:bodyPr rtlCol="0" anchor="ctr"/>
+                <a:lstStyle/>
+                <a:p>
+                  <a:pPr algn="ctr"/>
+                  <a:r>
+                    <a:rPr kumimoji="1" lang="en-US" altLang="ja-JP" sz="1000" dirty="0" smtClean="0"/>
+                    <a:t>2</a:t>
+                  </a:r>
+                  <a:endParaRPr kumimoji="1" lang="ja-JP" altLang="en-US" sz="1000" dirty="0"/>
+                </a:p>
+              </p:txBody>
+            </p:sp>
+            <p:sp>
+              <p:nvSpPr>
+                <p:cNvPr id="238" name="正方形/長方形 237"/>
+                <p:cNvSpPr/>
+                <p:nvPr/>
+              </p:nvSpPr>
+              <p:spPr>
+                <a:xfrm>
+                  <a:off x="2512650" y="4674882"/>
+                  <a:ext cx="144000" cy="144000"/>
+                </a:xfrm>
+                <a:prstGeom prst="rect">
+                  <a:avLst/>
+                </a:prstGeom>
+              </p:spPr>
+              <p:style>
+                <a:lnRef idx="2">
+                  <a:schemeClr val="accent1">
+                    <a:shade val="50000"/>
+                  </a:schemeClr>
+                </a:lnRef>
+                <a:fillRef idx="1">
+                  <a:schemeClr val="accent1"/>
+                </a:fillRef>
+                <a:effectRef idx="0">
+                  <a:schemeClr val="accent1"/>
+                </a:effectRef>
+                <a:fontRef idx="minor">
+                  <a:schemeClr val="lt1"/>
+                </a:fontRef>
+              </p:style>
+              <p:txBody>
+                <a:bodyPr rtlCol="0" anchor="ctr"/>
+                <a:lstStyle/>
+                <a:p>
+                  <a:pPr algn="ctr"/>
+                  <a:r>
+                    <a:rPr kumimoji="1" lang="en-US" altLang="ja-JP" sz="1000" dirty="0" smtClean="0"/>
+                    <a:t>3</a:t>
+                  </a:r>
+                  <a:endParaRPr kumimoji="1" lang="ja-JP" altLang="en-US" sz="1000" dirty="0"/>
+                </a:p>
+              </p:txBody>
+            </p:sp>
+            <p:cxnSp>
+              <p:nvCxnSpPr>
+                <p:cNvPr id="239" name="直線コネクタ 238"/>
+                <p:cNvCxnSpPr>
+                  <a:stCxn id="236" idx="2"/>
+                  <a:endCxn id="254" idx="0"/>
+                </p:cNvCxnSpPr>
+                <p:nvPr/>
+              </p:nvCxnSpPr>
+              <p:spPr>
+                <a:xfrm>
+                  <a:off x="2152650" y="4821360"/>
+                  <a:ext cx="0" cy="468465"/>
+                </a:xfrm>
+                <a:prstGeom prst="line">
+                  <a:avLst/>
+                </a:prstGeom>
+              </p:spPr>
+              <p:style>
+                <a:lnRef idx="1">
+                  <a:schemeClr val="dk1"/>
+                </a:lnRef>
+                <a:fillRef idx="0">
+                  <a:schemeClr val="dk1"/>
+                </a:fillRef>
+                <a:effectRef idx="0">
+                  <a:schemeClr val="dk1"/>
+                </a:effectRef>
+                <a:fontRef idx="minor">
+                  <a:schemeClr val="tx1"/>
+                </a:fontRef>
+              </p:style>
+            </p:cxnSp>
+            <p:cxnSp>
+              <p:nvCxnSpPr>
+                <p:cNvPr id="240" name="直線コネクタ 239"/>
+                <p:cNvCxnSpPr>
+                  <a:stCxn id="237" idx="2"/>
+                  <a:endCxn id="255" idx="0"/>
+                </p:cNvCxnSpPr>
+                <p:nvPr/>
+              </p:nvCxnSpPr>
+              <p:spPr>
+                <a:xfrm>
+                  <a:off x="2368650" y="4818031"/>
+                  <a:ext cx="0" cy="471794"/>
+                </a:xfrm>
+                <a:prstGeom prst="line">
+                  <a:avLst/>
+                </a:prstGeom>
+              </p:spPr>
+              <p:style>
+                <a:lnRef idx="1">
+                  <a:schemeClr val="dk1"/>
+                </a:lnRef>
+                <a:fillRef idx="0">
+                  <a:schemeClr val="dk1"/>
+                </a:fillRef>
+                <a:effectRef idx="0">
+                  <a:schemeClr val="dk1"/>
+                </a:effectRef>
+                <a:fontRef idx="minor">
+                  <a:schemeClr val="tx1"/>
+                </a:fontRef>
+              </p:style>
+            </p:cxnSp>
+            <p:sp>
+              <p:nvSpPr>
+                <p:cNvPr id="241" name="正方形/長方形 240"/>
+                <p:cNvSpPr/>
+                <p:nvPr/>
+              </p:nvSpPr>
+              <p:spPr>
+                <a:xfrm>
+                  <a:off x="3771150" y="4821825"/>
+                  <a:ext cx="1440000" cy="1440000"/>
+                </a:xfrm>
+                <a:prstGeom prst="rect">
+                  <a:avLst/>
+                </a:prstGeom>
+                <a:ln>
+                  <a:solidFill>
+                    <a:schemeClr val="accent1"/>
+                  </a:solidFill>
+                </a:ln>
+              </p:spPr>
+              <p:style>
+                <a:lnRef idx="2">
+                  <a:schemeClr val="accent3">
+                    <a:shade val="50000"/>
+                  </a:schemeClr>
+                </a:lnRef>
+                <a:fillRef idx="1">
+                  <a:schemeClr val="accent3"/>
+                </a:fillRef>
+                <a:effectRef idx="0">
+                  <a:schemeClr val="accent3"/>
+                </a:effectRef>
+                <a:fontRef idx="minor">
+                  <a:schemeClr val="lt1"/>
+                </a:fontRef>
+              </p:style>
+              <p:txBody>
+                <a:bodyPr rtlCol="0" anchor="b" anchorCtr="0"/>
+                <a:lstStyle/>
+                <a:p>
+                  <a:pPr algn="ctr"/>
+                  <a:r>
+                    <a:rPr kumimoji="1" lang="en-US" altLang="ja-JP" sz="1000" dirty="0" smtClean="0"/>
+                    <a:t>PM#2</a:t>
+                  </a:r>
+                  <a:endParaRPr kumimoji="1" lang="ja-JP" altLang="en-US" sz="1000" dirty="0"/>
+                </a:p>
+              </p:txBody>
+            </p:sp>
+            <p:grpSp>
+              <p:nvGrpSpPr>
+                <p:cNvPr id="242" name="グループ化 241"/>
+                <p:cNvGrpSpPr/>
+                <p:nvPr/>
+              </p:nvGrpSpPr>
+              <p:grpSpPr>
+                <a:xfrm>
+                  <a:off x="4131150" y="5289825"/>
+                  <a:ext cx="720000" cy="504000"/>
+                  <a:chOff x="4320000" y="2767876"/>
+                  <a:chExt cx="720000" cy="504000"/>
+                </a:xfrm>
+              </p:grpSpPr>
+              <p:sp>
+                <p:nvSpPr>
+                  <p:cNvPr id="248" name="正方形/長方形 247"/>
+                  <p:cNvSpPr/>
+                  <p:nvPr/>
+                </p:nvSpPr>
+                <p:spPr>
+                  <a:xfrm>
+                    <a:off x="4320000" y="2911876"/>
+                    <a:ext cx="720000" cy="360000"/>
+                  </a:xfrm>
+                  <a:prstGeom prst="rect">
+                    <a:avLst/>
+                  </a:prstGeom>
+                </p:spPr>
+                <p:style>
+                  <a:lnRef idx="2">
+                    <a:schemeClr val="accent1">
+                      <a:shade val="50000"/>
+                    </a:schemeClr>
+                  </a:lnRef>
+                  <a:fillRef idx="1">
+                    <a:schemeClr val="accent1"/>
+                  </a:fillRef>
+                  <a:effectRef idx="0">
+                    <a:schemeClr val="accent1"/>
+                  </a:effectRef>
+                  <a:fontRef idx="minor">
+                    <a:schemeClr val="lt1"/>
+                  </a:fontRef>
+                </p:style>
+                <p:txBody>
+                  <a:bodyPr rtlCol="0" anchor="ctr"/>
+                  <a:lstStyle/>
+                  <a:p>
+                    <a:pPr algn="ctr"/>
+                    <a:r>
+                      <a:rPr kumimoji="1" lang="en-US" altLang="ja-JP" sz="1000" dirty="0" smtClean="0"/>
+                      <a:t>VM#2</a:t>
+                    </a:r>
+                    <a:endParaRPr kumimoji="1" lang="ja-JP" altLang="en-US" sz="1000" dirty="0"/>
+                  </a:p>
+                </p:txBody>
+              </p:sp>
+              <p:grpSp>
+                <p:nvGrpSpPr>
+                  <p:cNvPr id="249" name="グループ化 248"/>
+                  <p:cNvGrpSpPr/>
+                  <p:nvPr/>
+                </p:nvGrpSpPr>
+                <p:grpSpPr>
+                  <a:xfrm>
+                    <a:off x="4500000" y="2767876"/>
+                    <a:ext cx="360000" cy="144000"/>
+                    <a:chOff x="5400000" y="2767876"/>
+                    <a:chExt cx="360000" cy="144000"/>
+                  </a:xfrm>
+                </p:grpSpPr>
+                <p:sp>
+                  <p:nvSpPr>
+                    <p:cNvPr id="250" name="正方形/長方形 249"/>
+                    <p:cNvSpPr/>
+                    <p:nvPr/>
+                  </p:nvSpPr>
+                  <p:spPr>
+                    <a:xfrm>
+                      <a:off x="5400000" y="2767876"/>
+                      <a:ext cx="144000" cy="144000"/>
+                    </a:xfrm>
+                    <a:prstGeom prst="rect">
+                      <a:avLst/>
+                    </a:prstGeom>
+                  </p:spPr>
+                  <p:style>
+                    <a:lnRef idx="2">
+                      <a:schemeClr val="accent1">
+                        <a:shade val="50000"/>
+                      </a:schemeClr>
+                    </a:lnRef>
+                    <a:fillRef idx="1">
+                      <a:schemeClr val="accent1"/>
+                    </a:fillRef>
+                    <a:effectRef idx="0">
+                      <a:schemeClr val="accent1"/>
+                    </a:effectRef>
+                    <a:fontRef idx="minor">
+                      <a:schemeClr val="lt1"/>
+                    </a:fontRef>
+                  </p:style>
+                  <p:txBody>
+                    <a:bodyPr rtlCol="0" anchor="ctr"/>
+                    <a:lstStyle/>
+                    <a:p>
+                      <a:pPr algn="ctr"/>
+                      <a:endParaRPr kumimoji="1" lang="ja-JP" altLang="en-US" sz="1000"/>
+                    </a:p>
+                  </p:txBody>
+                </p:sp>
+                <p:sp>
+                  <p:nvSpPr>
+                    <p:cNvPr id="251" name="正方形/長方形 250"/>
+                    <p:cNvSpPr/>
+                    <p:nvPr/>
+                  </p:nvSpPr>
+                  <p:spPr>
+                    <a:xfrm>
+                      <a:off x="5616000" y="2767876"/>
+                      <a:ext cx="144000" cy="144000"/>
+                    </a:xfrm>
+                    <a:prstGeom prst="rect">
+                      <a:avLst/>
+                    </a:prstGeom>
+                  </p:spPr>
+                  <p:style>
+                    <a:lnRef idx="2">
+                      <a:schemeClr val="accent1">
+                        <a:shade val="50000"/>
+                      </a:schemeClr>
+                    </a:lnRef>
+                    <a:fillRef idx="1">
+                      <a:schemeClr val="accent1"/>
+                    </a:fillRef>
+                    <a:effectRef idx="0">
+                      <a:schemeClr val="accent1"/>
+                    </a:effectRef>
+                    <a:fontRef idx="minor">
+                      <a:schemeClr val="lt1"/>
+                    </a:fontRef>
+                  </p:style>
+                  <p:txBody>
+                    <a:bodyPr rtlCol="0" anchor="ctr"/>
+                    <a:lstStyle/>
+                    <a:p>
+                      <a:pPr algn="ctr"/>
+                      <a:endParaRPr kumimoji="1" lang="ja-JP" altLang="en-US" sz="1000"/>
+                    </a:p>
+                  </p:txBody>
+                </p:sp>
+              </p:grpSp>
+            </p:grpSp>
+            <p:sp>
+              <p:nvSpPr>
+                <p:cNvPr id="243" name="正方形/長方形 242"/>
+                <p:cNvSpPr/>
+                <p:nvPr/>
+              </p:nvSpPr>
+              <p:spPr>
+                <a:xfrm>
+                  <a:off x="4311150" y="4677360"/>
+                  <a:ext cx="144000" cy="144000"/>
+                </a:xfrm>
+                <a:prstGeom prst="rect">
+                  <a:avLst/>
+                </a:prstGeom>
+              </p:spPr>
+              <p:style>
+                <a:lnRef idx="2">
+                  <a:schemeClr val="accent1">
+                    <a:shade val="50000"/>
+                  </a:schemeClr>
+                </a:lnRef>
+                <a:fillRef idx="1">
+                  <a:schemeClr val="accent1"/>
+                </a:fillRef>
+                <a:effectRef idx="0">
+                  <a:schemeClr val="accent1"/>
+                </a:effectRef>
+                <a:fontRef idx="minor">
+                  <a:schemeClr val="lt1"/>
+                </a:fontRef>
+              </p:style>
+              <p:txBody>
+                <a:bodyPr wrap="none" rtlCol="0" anchor="ctr"/>
+                <a:lstStyle/>
+                <a:p>
+                  <a:pPr algn="ctr"/>
+                  <a:r>
+                    <a:rPr kumimoji="1" lang="en-US" altLang="ja-JP" sz="1000" dirty="0" smtClean="0"/>
+                    <a:t>1’</a:t>
+                  </a:r>
+                  <a:endParaRPr kumimoji="1" lang="ja-JP" altLang="en-US" sz="1000" dirty="0"/>
+                </a:p>
+              </p:txBody>
+            </p:sp>
+            <p:sp>
+              <p:nvSpPr>
+                <p:cNvPr id="244" name="正方形/長方形 243"/>
+                <p:cNvSpPr/>
+                <p:nvPr/>
+              </p:nvSpPr>
+              <p:spPr>
+                <a:xfrm>
+                  <a:off x="4527150" y="4674031"/>
+                  <a:ext cx="144000" cy="144000"/>
+                </a:xfrm>
+                <a:prstGeom prst="rect">
+                  <a:avLst/>
+                </a:prstGeom>
+              </p:spPr>
+              <p:style>
+                <a:lnRef idx="2">
+                  <a:schemeClr val="accent1">
+                    <a:shade val="50000"/>
+                  </a:schemeClr>
+                </a:lnRef>
+                <a:fillRef idx="1">
+                  <a:schemeClr val="accent1"/>
+                </a:fillRef>
+                <a:effectRef idx="0">
+                  <a:schemeClr val="accent1"/>
+                </a:effectRef>
+                <a:fontRef idx="minor">
+                  <a:schemeClr val="lt1"/>
+                </a:fontRef>
+              </p:style>
+              <p:txBody>
+                <a:bodyPr wrap="none" rtlCol="0" anchor="ctr"/>
+                <a:lstStyle/>
+                <a:p>
+                  <a:pPr algn="ctr"/>
+                  <a:r>
+                    <a:rPr kumimoji="1" lang="en-US" altLang="ja-JP" sz="1000" dirty="0" smtClean="0"/>
+                    <a:t>2’</a:t>
+                  </a:r>
+                  <a:endParaRPr kumimoji="1" lang="ja-JP" altLang="en-US" sz="1000" dirty="0"/>
+                </a:p>
+              </p:txBody>
+            </p:sp>
+            <p:sp>
+              <p:nvSpPr>
+                <p:cNvPr id="245" name="正方形/長方形 244"/>
+                <p:cNvSpPr/>
+                <p:nvPr/>
+              </p:nvSpPr>
+              <p:spPr>
+                <a:xfrm>
+                  <a:off x="4743150" y="4674882"/>
+                  <a:ext cx="144000" cy="144000"/>
+                </a:xfrm>
+                <a:prstGeom prst="rect">
+                  <a:avLst/>
+                </a:prstGeom>
+              </p:spPr>
+              <p:style>
+                <a:lnRef idx="2">
+                  <a:schemeClr val="accent1">
+                    <a:shade val="50000"/>
+                  </a:schemeClr>
+                </a:lnRef>
+                <a:fillRef idx="1">
+                  <a:schemeClr val="accent1"/>
+                </a:fillRef>
+                <a:effectRef idx="0">
+                  <a:schemeClr val="accent1"/>
+                </a:effectRef>
+                <a:fontRef idx="minor">
+                  <a:schemeClr val="lt1"/>
+                </a:fontRef>
+              </p:style>
+              <p:txBody>
+                <a:bodyPr wrap="none" rtlCol="0" anchor="ctr"/>
+                <a:lstStyle/>
+                <a:p>
+                  <a:pPr algn="ctr"/>
+                  <a:r>
+                    <a:rPr kumimoji="1" lang="en-US" altLang="ja-JP" sz="1000" dirty="0" smtClean="0"/>
+                    <a:t>3’</a:t>
+                  </a:r>
+                  <a:endParaRPr kumimoji="1" lang="ja-JP" altLang="en-US" sz="1000" dirty="0"/>
+                </a:p>
+              </p:txBody>
+            </p:sp>
+            <p:cxnSp>
+              <p:nvCxnSpPr>
+                <p:cNvPr id="246" name="直線コネクタ 245"/>
+                <p:cNvCxnSpPr>
+                  <a:stCxn id="243" idx="2"/>
+                  <a:endCxn id="250" idx="0"/>
+                </p:cNvCxnSpPr>
+                <p:nvPr/>
+              </p:nvCxnSpPr>
+              <p:spPr>
+                <a:xfrm>
+                  <a:off x="4383150" y="4821360"/>
+                  <a:ext cx="0" cy="468465"/>
+                </a:xfrm>
+                <a:prstGeom prst="line">
+                  <a:avLst/>
+                </a:prstGeom>
+              </p:spPr>
+              <p:style>
+                <a:lnRef idx="1">
+                  <a:schemeClr val="dk1"/>
+                </a:lnRef>
+                <a:fillRef idx="0">
+                  <a:schemeClr val="dk1"/>
+                </a:fillRef>
+                <a:effectRef idx="0">
+                  <a:schemeClr val="dk1"/>
+                </a:effectRef>
+                <a:fontRef idx="minor">
+                  <a:schemeClr val="tx1"/>
+                </a:fontRef>
+              </p:style>
+            </p:cxnSp>
+            <p:cxnSp>
+              <p:nvCxnSpPr>
+                <p:cNvPr id="247" name="直線コネクタ 246"/>
+                <p:cNvCxnSpPr>
+                  <a:stCxn id="244" idx="2"/>
+                  <a:endCxn id="251" idx="0"/>
+                </p:cNvCxnSpPr>
+                <p:nvPr/>
+              </p:nvCxnSpPr>
+              <p:spPr>
+                <a:xfrm>
+                  <a:off x="4599150" y="4818031"/>
+                  <a:ext cx="0" cy="471794"/>
+                </a:xfrm>
+                <a:prstGeom prst="line">
+                  <a:avLst/>
+                </a:prstGeom>
+              </p:spPr>
+              <p:style>
+                <a:lnRef idx="1">
+                  <a:schemeClr val="dk1"/>
+                </a:lnRef>
+                <a:fillRef idx="0">
+                  <a:schemeClr val="dk1"/>
+                </a:fillRef>
+                <a:effectRef idx="0">
+                  <a:schemeClr val="dk1"/>
+                </a:effectRef>
+                <a:fontRef idx="minor">
+                  <a:schemeClr val="tx1"/>
+                </a:fontRef>
+              </p:style>
+            </p:cxnSp>
+          </p:grpSp>
+        </p:grpSp>
+        <p:sp>
+          <p:nvSpPr>
+            <p:cNvPr id="2" name="角丸四角形 1"/>
+            <p:cNvSpPr/>
+            <p:nvPr/>
+          </p:nvSpPr>
+          <p:spPr>
+            <a:xfrm>
+              <a:off x="6076755" y="2929515"/>
+              <a:ext cx="540000" cy="180000"/>
+            </a:xfrm>
+            <a:prstGeom prst="roundRect">
+              <a:avLst/>
+            </a:prstGeom>
+            <a:solidFill>
+              <a:srgbClr val="FFC000"/>
+            </a:solidFill>
+          </p:spPr>
+          <p:style>
+            <a:lnRef idx="2">
+              <a:schemeClr val="accent1">
+                <a:shade val="50000"/>
+              </a:schemeClr>
+            </a:lnRef>
+            <a:fillRef idx="1">
+              <a:schemeClr val="accent1"/>
+            </a:fillRef>
+            <a:effectRef idx="0">
+              <a:schemeClr val="accent1"/>
+            </a:effectRef>
+            <a:fontRef idx="minor">
+              <a:schemeClr val="lt1"/>
+            </a:fontRef>
+          </p:style>
+          <p:txBody>
+            <a:bodyPr wrap="none" lIns="36000" tIns="36000" rIns="36000" bIns="36000" rtlCol="0" anchor="ctr">
+              <a:noAutofit/>
+            </a:bodyPr>
+            <a:lstStyle/>
+            <a:p>
+              <a:pPr algn="ctr"/>
+              <a:r>
+                <a:rPr kumimoji="1" lang="en-US" altLang="ja-JP" sz="1000" b="1" dirty="0" smtClean="0">
+                  <a:solidFill>
+                    <a:schemeClr val="tx1"/>
+                  </a:solidFill>
+                </a:rPr>
+                <a:t>Suspend</a:t>
+              </a:r>
+              <a:endParaRPr kumimoji="1" lang="ja-JP" altLang="en-US" sz="1000" b="1" dirty="0">
+                <a:solidFill>
+                  <a:schemeClr val="tx1"/>
+                </a:solidFill>
+              </a:endParaRPr>
+            </a:p>
+          </p:txBody>
+        </p:sp>
+      </p:grpSp>
     </p:spTree>
     <p:extLst>
       <p:ext uri="{BB962C8B-B14F-4D97-AF65-F5344CB8AC3E}">

</xml_diff>